<commit_message>
Rimosso Exponential (attempt) da presentazione
</commit_message>
<xml_diff>
--- a/Consegna/Control Tower System Analysis (Barsanti, Bertini, Treccozzi)/Presentation/Control Tower System Analysis.pptx
+++ b/Consegna/Control Tower System Analysis (Barsanti, Bertini, Treccozzi)/Presentation/Control Tower System Analysis.pptx
@@ -12393,7 +12393,7 @@
         </p:nvSpPr>
         <p:spPr>
           <a:xfrm>
-            <a:off x="299112" y="1875068"/>
+            <a:off x="341833" y="2251766"/>
             <a:ext cx="6036918" cy="646331"/>
           </a:xfrm>
           <a:prstGeom prst="rect">
@@ -12428,8 +12428,8 @@
           </a:p>
         </p:txBody>
       </p:sp>
-      <mc:AlternateContent xmlns:mc="http://schemas.openxmlformats.org/markup-compatibility/2006" xmlns:a14="http://schemas.microsoft.com/office/drawing/2010/main">
-        <mc:Choice Requires="a14">
+      <mc:AlternateContent xmlns:mc="http://schemas.openxmlformats.org/markup-compatibility/2006">
+        <mc:Choice xmlns:a14="http://schemas.microsoft.com/office/drawing/2010/main" Requires="a14">
           <p:sp>
             <p:nvSpPr>
               <p:cNvPr id="7" name="CasellaDiTesto 6">
@@ -12444,7 +12444,7 @@
             </p:nvSpPr>
             <p:spPr>
               <a:xfrm>
-                <a:off x="7313092" y="1974767"/>
+                <a:off x="7239341" y="2297932"/>
                 <a:ext cx="3915816" cy="553998"/>
               </a:xfrm>
               <a:prstGeom prst="rect">
@@ -12615,7 +12615,7 @@
             </p:txBody>
           </p:sp>
         </mc:Choice>
-        <mc:Fallback xmlns="">
+        <mc:Fallback>
           <p:sp>
             <p:nvSpPr>
               <p:cNvPr id="7" name="CasellaDiTesto 6">
@@ -12632,7 +12632,7 @@
             </p:nvSpPr>
             <p:spPr>
               <a:xfrm>
-                <a:off x="7313092" y="1974767"/>
+                <a:off x="7239341" y="2297932"/>
                 <a:ext cx="3915816" cy="553998"/>
               </a:xfrm>
               <a:prstGeom prst="rect">
@@ -12660,12 +12660,48 @@
           </p:sp>
         </mc:Fallback>
       </mc:AlternateContent>
+      <p:pic>
+        <p:nvPicPr>
+          <p:cNvPr id="14" name="Immagine 13" descr="Immagine che contiene screenshot&#10;&#10;Descrizione generata automaticamente">
+            <a:extLst>
+              <a:ext uri="{FF2B5EF4-FFF2-40B4-BE49-F238E27FC236}">
+                <a16:creationId xmlns:a16="http://schemas.microsoft.com/office/drawing/2014/main" id="{14CED053-DB76-4656-8F88-451518AB7F9E}"/>
+              </a:ext>
+            </a:extLst>
+          </p:cNvPr>
+          <p:cNvPicPr>
+            <a:picLocks noChangeAspect="1"/>
+          </p:cNvPicPr>
+          <p:nvPr/>
+        </p:nvPicPr>
+        <p:blipFill>
+          <a:blip r:embed="rId3">
+            <a:extLst>
+              <a:ext uri="{28A0092B-C50C-407E-A947-70E740481C1C}">
+                <a14:useLocalDpi xmlns:a14="http://schemas.microsoft.com/office/drawing/2010/main" val="0"/>
+              </a:ext>
+            </a:extLst>
+          </a:blip>
+          <a:stretch>
+            <a:fillRect/>
+          </a:stretch>
+        </p:blipFill>
+        <p:spPr>
+          <a:xfrm>
+            <a:off x="6908893" y="3429000"/>
+            <a:ext cx="4576712" cy="3316984"/>
+          </a:xfrm>
+          <a:prstGeom prst="rect">
+            <a:avLst/>
+          </a:prstGeom>
+        </p:spPr>
+      </p:pic>
       <p:sp>
         <p:nvSpPr>
-          <p:cNvPr id="8" name="Rettangolo 7">
-            <a:extLst>
-              <a:ext uri="{FF2B5EF4-FFF2-40B4-BE49-F238E27FC236}">
-                <a16:creationId xmlns:a16="http://schemas.microsoft.com/office/drawing/2014/main" id="{361C100B-EA90-49A8-B869-212AA0A37C28}"/>
+          <p:cNvPr id="15" name="Rettangolo 14">
+            <a:extLst>
+              <a:ext uri="{FF2B5EF4-FFF2-40B4-BE49-F238E27FC236}">
+                <a16:creationId xmlns:a16="http://schemas.microsoft.com/office/drawing/2014/main" id="{F95056F1-722E-48C4-A808-54CC44B37C95}"/>
               </a:ext>
             </a:extLst>
           </p:cNvPr>
@@ -12674,8 +12710,8 @@
         </p:nvSpPr>
         <p:spPr>
           <a:xfrm>
-            <a:off x="299112" y="2882175"/>
-            <a:ext cx="5709258" cy="1077218"/>
+            <a:off x="341833" y="4649496"/>
+            <a:ext cx="5709258" cy="646331"/>
           </a:xfrm>
           <a:prstGeom prst="rect">
             <a:avLst/>
@@ -12706,423 +12742,14 @@
               </a:rPr>
               <a:t>Exponential Warm-up Time:</a:t>
             </a:r>
-            <a:br>
-              <a:rPr lang="en-GB" sz="3600" kern="1400" dirty="0">
-                <a:solidFill>
-                  <a:srgbClr val="2A7B88"/>
-                </a:solidFill>
-                <a:latin typeface="Cambria" panose="02040503050406030204" pitchFamily="18" charset="0"/>
-                <a:ea typeface="Times New Roman" panose="02020603050405020304" pitchFamily="18" charset="0"/>
-                <a:cs typeface="Times New Roman" panose="02020603050405020304" pitchFamily="18" charset="0"/>
-              </a:rPr>
-            </a:br>
-            <a:r>
-              <a:rPr lang="en-GB" sz="2800" kern="1400" dirty="0">
-                <a:solidFill>
-                  <a:srgbClr val="2A7B88"/>
-                </a:solidFill>
-                <a:latin typeface="Cambria" panose="02040503050406030204" pitchFamily="18" charset="0"/>
-                <a:ea typeface="Times New Roman" panose="02020603050405020304" pitchFamily="18" charset="0"/>
-                <a:cs typeface="Times New Roman" panose="02020603050405020304" pitchFamily="18" charset="0"/>
-              </a:rPr>
-              <a:t>(attempt)</a:t>
-            </a:r>
-          </a:p>
-        </p:txBody>
-      </p:sp>
-      <mc:AlternateContent xmlns:mc="http://schemas.openxmlformats.org/markup-compatibility/2006" xmlns:a14="http://schemas.microsoft.com/office/drawing/2010/main">
-        <mc:Choice Requires="a14">
-          <p:sp>
-            <p:nvSpPr>
-              <p:cNvPr id="9" name="CasellaDiTesto 8">
-                <a:extLst>
-                  <a:ext uri="{FF2B5EF4-FFF2-40B4-BE49-F238E27FC236}">
-                    <a16:creationId xmlns:a16="http://schemas.microsoft.com/office/drawing/2014/main" id="{9366FF3F-7967-4AE3-8508-A1D8085549A6}"/>
-                  </a:ext>
-                </a:extLst>
-              </p:cNvPr>
-              <p:cNvSpPr txBox="1"/>
-              <p:nvPr/>
-            </p:nvSpPr>
-            <p:spPr>
-              <a:xfrm>
-                <a:off x="6336030" y="2907084"/>
-                <a:ext cx="5421356" cy="553998"/>
-              </a:xfrm>
-              <a:prstGeom prst="rect">
-                <a:avLst/>
-              </a:prstGeom>
-              <a:noFill/>
-            </p:spPr>
-            <p:txBody>
-              <a:bodyPr wrap="none" lIns="0" tIns="0" rIns="0" bIns="0" rtlCol="0">
-                <a:spAutoFit/>
-              </a:bodyPr>
-              <a:lstStyle/>
-              <a:p>
-                <a:pPr/>
-                <a14:m>
-                  <m:oMathPara xmlns:m="http://schemas.openxmlformats.org/officeDocument/2006/math">
-                    <m:oMathParaPr>
-                      <m:jc m:val="centerGroup"/>
-                    </m:oMathParaPr>
-                    <m:oMath xmlns:m="http://schemas.openxmlformats.org/officeDocument/2006/math">
-                      <m:sSub>
-                        <m:sSubPr>
-                          <m:ctrlPr>
-                            <a:rPr lang="it-IT" sz="3600" i="1" smtClean="0">
-                              <a:latin typeface="Cambria Math" panose="02040503050406030204" pitchFamily="18" charset="0"/>
-                            </a:rPr>
-                          </m:ctrlPr>
-                        </m:sSubPr>
-                        <m:e>
-                          <m:r>
-                            <m:rPr>
-                              <m:sty m:val="p"/>
-                            </m:rPr>
-                            <a:rPr lang="it-IT" sz="3600" b="0" i="0" smtClean="0">
-                              <a:latin typeface="Cambria Math" panose="02040503050406030204" pitchFamily="18" charset="0"/>
-                            </a:rPr>
-                            <m:t>t</m:t>
-                          </m:r>
-                        </m:e>
-                        <m:sub>
-                          <m:r>
-                            <m:rPr>
-                              <m:sty m:val="p"/>
-                            </m:rPr>
-                            <a:rPr lang="it-IT" sz="3600" b="0" i="0" smtClean="0">
-                              <a:latin typeface="Cambria Math" panose="02040503050406030204" pitchFamily="18" charset="0"/>
-                            </a:rPr>
-                            <m:t>WA</m:t>
-                          </m:r>
-                        </m:sub>
-                      </m:sSub>
-                      <m:r>
-                        <a:rPr lang="it-IT" sz="3600" b="0" i="0" smtClean="0">
-                          <a:latin typeface="Cambria Math" panose="02040503050406030204" pitchFamily="18" charset="0"/>
-                        </a:rPr>
-                        <m:t>=</m:t>
-                      </m:r>
-                      <m:r>
-                        <m:rPr>
-                          <m:sty m:val="p"/>
-                        </m:rPr>
-                        <a:rPr lang="it-IT" sz="3600" b="0" i="0" smtClean="0">
-                          <a:latin typeface="Cambria Math" panose="02040503050406030204" pitchFamily="18" charset="0"/>
-                        </a:rPr>
-                        <m:t>k</m:t>
-                      </m:r>
-                      <m:r>
-                        <a:rPr lang="it-IT" sz="3600" b="0" i="0" smtClean="0">
-                          <a:latin typeface="Cambria Math" panose="02040503050406030204" pitchFamily="18" charset="0"/>
-                        </a:rPr>
-                        <m:t>(</m:t>
-                      </m:r>
-                      <m:sSub>
-                        <m:sSubPr>
-                          <m:ctrlPr>
-                            <a:rPr lang="it-IT" sz="3600" b="0" i="1" smtClean="0">
-                              <a:latin typeface="Cambria Math" panose="02040503050406030204" pitchFamily="18" charset="0"/>
-                            </a:rPr>
-                          </m:ctrlPr>
-                        </m:sSubPr>
-                        <m:e>
-                          <m:r>
-                            <m:rPr>
-                              <m:sty m:val="p"/>
-                            </m:rPr>
-                            <a:rPr lang="it-IT" sz="3600" b="0" i="0" smtClean="0">
-                              <a:latin typeface="Cambria Math" panose="02040503050406030204" pitchFamily="18" charset="0"/>
-                            </a:rPr>
-                            <m:t>t</m:t>
-                          </m:r>
-                        </m:e>
-                        <m:sub>
-                          <m:r>
-                            <m:rPr>
-                              <m:sty m:val="p"/>
-                            </m:rPr>
-                            <a:rPr lang="it-IT" sz="3600" b="0" i="0" smtClean="0">
-                              <a:latin typeface="Cambria Math" panose="02040503050406030204" pitchFamily="18" charset="0"/>
-                            </a:rPr>
-                            <m:t>A</m:t>
-                          </m:r>
-                        </m:sub>
-                      </m:sSub>
-                      <m:r>
-                        <a:rPr lang="it-IT" sz="3600" b="0" i="0" smtClean="0">
-                          <a:latin typeface="Cambria Math" panose="02040503050406030204" pitchFamily="18" charset="0"/>
-                        </a:rPr>
-                        <m:t>+</m:t>
-                      </m:r>
-                      <m:sSub>
-                        <m:sSubPr>
-                          <m:ctrlPr>
-                            <a:rPr lang="it-IT" sz="3600" b="0" i="1" smtClean="0">
-                              <a:latin typeface="Cambria Math" panose="02040503050406030204" pitchFamily="18" charset="0"/>
-                            </a:rPr>
-                          </m:ctrlPr>
-                        </m:sSubPr>
-                        <m:e>
-                          <m:r>
-                            <m:rPr>
-                              <m:sty m:val="p"/>
-                            </m:rPr>
-                            <a:rPr lang="it-IT" sz="3600" b="0" i="0" smtClean="0">
-                              <a:latin typeface="Cambria Math" panose="02040503050406030204" pitchFamily="18" charset="0"/>
-                            </a:rPr>
-                            <m:t>t</m:t>
-                          </m:r>
-                        </m:e>
-                        <m:sub>
-                          <m:r>
-                            <m:rPr>
-                              <m:sty m:val="p"/>
-                            </m:rPr>
-                            <a:rPr lang="it-IT" sz="3600" b="0" i="0" smtClean="0">
-                              <a:latin typeface="Cambria Math" panose="02040503050406030204" pitchFamily="18" charset="0"/>
-                            </a:rPr>
-                            <m:t>L</m:t>
-                          </m:r>
-                        </m:sub>
-                      </m:sSub>
-                      <m:r>
-                        <a:rPr lang="it-IT" sz="3600">
-                          <a:latin typeface="Cambria Math" panose="02040503050406030204" pitchFamily="18" charset="0"/>
-                        </a:rPr>
-                        <m:t>+</m:t>
-                      </m:r>
-                      <m:sSub>
-                        <m:sSubPr>
-                          <m:ctrlPr>
-                            <a:rPr lang="it-IT" sz="3600" i="1">
-                              <a:latin typeface="Cambria Math" panose="02040503050406030204" pitchFamily="18" charset="0"/>
-                            </a:rPr>
-                          </m:ctrlPr>
-                        </m:sSubPr>
-                        <m:e>
-                          <m:r>
-                            <m:rPr>
-                              <m:sty m:val="p"/>
-                            </m:rPr>
-                            <a:rPr lang="it-IT" sz="3600">
-                              <a:latin typeface="Cambria Math" panose="02040503050406030204" pitchFamily="18" charset="0"/>
-                            </a:rPr>
-                            <m:t>t</m:t>
-                          </m:r>
-                        </m:e>
-                        <m:sub>
-                          <m:r>
-                            <m:rPr>
-                              <m:sty m:val="p"/>
-                            </m:rPr>
-                            <a:rPr lang="it-IT" sz="3600" b="0" i="0" smtClean="0">
-                              <a:latin typeface="Cambria Math" panose="02040503050406030204" pitchFamily="18" charset="0"/>
-                            </a:rPr>
-                            <m:t>P</m:t>
-                          </m:r>
-                        </m:sub>
-                      </m:sSub>
-                      <m:r>
-                        <a:rPr lang="it-IT" sz="3600" b="0" i="1" smtClean="0">
-                          <a:latin typeface="Cambria Math" panose="02040503050406030204" pitchFamily="18" charset="0"/>
-                        </a:rPr>
-                        <m:t>+</m:t>
-                      </m:r>
-                      <m:sSub>
-                        <m:sSubPr>
-                          <m:ctrlPr>
-                            <a:rPr lang="it-IT" sz="3600" i="1">
-                              <a:latin typeface="Cambria Math" panose="02040503050406030204" pitchFamily="18" charset="0"/>
-                            </a:rPr>
-                          </m:ctrlPr>
-                        </m:sSubPr>
-                        <m:e>
-                          <m:r>
-                            <m:rPr>
-                              <m:sty m:val="p"/>
-                            </m:rPr>
-                            <a:rPr lang="it-IT" sz="3600">
-                              <a:latin typeface="Cambria Math" panose="02040503050406030204" pitchFamily="18" charset="0"/>
-                            </a:rPr>
-                            <m:t>t</m:t>
-                          </m:r>
-                        </m:e>
-                        <m:sub>
-                          <m:r>
-                            <m:rPr>
-                              <m:sty m:val="p"/>
-                            </m:rPr>
-                            <a:rPr lang="it-IT" sz="3600" b="0" i="0" smtClean="0">
-                              <a:latin typeface="Cambria Math" panose="02040503050406030204" pitchFamily="18" charset="0"/>
-                            </a:rPr>
-                            <m:t>O</m:t>
-                          </m:r>
-                        </m:sub>
-                      </m:sSub>
-                      <m:r>
-                        <a:rPr lang="it-IT" sz="3600" b="0" i="1" smtClean="0">
-                          <a:latin typeface="Cambria Math" panose="02040503050406030204" pitchFamily="18" charset="0"/>
-                        </a:rPr>
-                        <m:t>)</m:t>
-                      </m:r>
-                    </m:oMath>
-                  </m:oMathPara>
-                </a14:m>
-                <a:endParaRPr lang="it-IT" sz="3600" dirty="0"/>
-              </a:p>
-            </p:txBody>
-          </p:sp>
-        </mc:Choice>
-        <mc:Fallback xmlns="">
-          <p:sp>
-            <p:nvSpPr>
-              <p:cNvPr id="9" name="CasellaDiTesto 8">
-                <a:extLst>
-                  <a:ext uri="{FF2B5EF4-FFF2-40B4-BE49-F238E27FC236}">
-                    <a16:creationId xmlns:a16="http://schemas.microsoft.com/office/drawing/2014/main" id="{9366FF3F-7967-4AE3-8508-A1D8085549A6}"/>
-                  </a:ext>
-                </a:extLst>
-              </p:cNvPr>
-              <p:cNvSpPr txBox="1">
-                <a:spLocks noRot="1" noChangeAspect="1" noMove="1" noResize="1" noEditPoints="1" noAdjustHandles="1" noChangeArrowheads="1" noChangeShapeType="1" noTextEdit="1"/>
-              </p:cNvSpPr>
-              <p:nvPr/>
-            </p:nvSpPr>
-            <p:spPr>
-              <a:xfrm>
-                <a:off x="6336030" y="2907084"/>
-                <a:ext cx="5421356" cy="553998"/>
-              </a:xfrm>
-              <a:prstGeom prst="rect">
-                <a:avLst/>
-              </a:prstGeom>
-              <a:blipFill>
-                <a:blip r:embed="rId3"/>
-                <a:stretch>
-                  <a:fillRect/>
-                </a:stretch>
-              </a:blipFill>
-            </p:spPr>
-            <p:txBody>
-              <a:bodyPr/>
-              <a:lstStyle/>
-              <a:p>
-                <a:r>
-                  <a:rPr lang="it-IT">
-                    <a:noFill/>
-                  </a:rPr>
-                  <a:t> </a:t>
-                </a:r>
-              </a:p>
-            </p:txBody>
-          </p:sp>
-        </mc:Fallback>
-      </mc:AlternateContent>
-      <p:pic>
-        <p:nvPicPr>
-          <p:cNvPr id="14" name="Immagine 13" descr="Immagine che contiene screenshot&#10;&#10;Descrizione generata automaticamente">
-            <a:extLst>
-              <a:ext uri="{FF2B5EF4-FFF2-40B4-BE49-F238E27FC236}">
-                <a16:creationId xmlns:a16="http://schemas.microsoft.com/office/drawing/2014/main" id="{14CED053-DB76-4656-8F88-451518AB7F9E}"/>
-              </a:ext>
-            </a:extLst>
-          </p:cNvPr>
-          <p:cNvPicPr>
-            <a:picLocks noChangeAspect="1"/>
-          </p:cNvPicPr>
-          <p:nvPr/>
-        </p:nvPicPr>
-        <p:blipFill>
-          <a:blip r:embed="rId4">
-            <a:extLst>
-              <a:ext uri="{28A0092B-C50C-407E-A947-70E740481C1C}">
-                <a14:useLocalDpi xmlns:a14="http://schemas.microsoft.com/office/drawing/2010/main" val="0"/>
-              </a:ext>
-            </a:extLst>
-          </a:blip>
-          <a:stretch>
-            <a:fillRect/>
-          </a:stretch>
-        </p:blipFill>
-        <p:spPr>
-          <a:xfrm>
-            <a:off x="7046423" y="3816541"/>
-            <a:ext cx="4094018" cy="2967150"/>
-          </a:xfrm>
-          <a:prstGeom prst="rect">
-            <a:avLst/>
-          </a:prstGeom>
-        </p:spPr>
-      </p:pic>
-      <p:sp>
-        <p:nvSpPr>
-          <p:cNvPr id="15" name="Rettangolo 14">
-            <a:extLst>
-              <a:ext uri="{FF2B5EF4-FFF2-40B4-BE49-F238E27FC236}">
-                <a16:creationId xmlns:a16="http://schemas.microsoft.com/office/drawing/2014/main" id="{F95056F1-722E-48C4-A808-54CC44B37C95}"/>
-              </a:ext>
-            </a:extLst>
-          </p:cNvPr>
-          <p:cNvSpPr/>
-          <p:nvPr/>
-        </p:nvSpPr>
-        <p:spPr>
-          <a:xfrm>
-            <a:off x="341832" y="4767883"/>
-            <a:ext cx="5709258" cy="1077218"/>
-          </a:xfrm>
-          <a:prstGeom prst="rect">
-            <a:avLst/>
-          </a:prstGeom>
-        </p:spPr>
-        <p:txBody>
-          <a:bodyPr wrap="square">
-            <a:spAutoFit/>
-          </a:bodyPr>
-          <a:lstStyle/>
-          <a:p>
-            <a:pPr algn="ctr">
-              <a:spcBef>
-                <a:spcPts val="600"/>
-              </a:spcBef>
-              <a:spcAft>
-                <a:spcPts val="600"/>
-              </a:spcAft>
-            </a:pPr>
-            <a:r>
-              <a:rPr lang="en-GB" sz="3600" kern="1400" dirty="0">
-                <a:solidFill>
-                  <a:srgbClr val="2A7B88"/>
-                </a:solidFill>
-                <a:latin typeface="Cambria" panose="02040503050406030204" pitchFamily="18" charset="0"/>
-                <a:ea typeface="Times New Roman" panose="02020603050405020304" pitchFamily="18" charset="0"/>
-                <a:cs typeface="Times New Roman" panose="02020603050405020304" pitchFamily="18" charset="0"/>
-              </a:rPr>
-              <a:t>Exponential Warm-up Time:</a:t>
-            </a:r>
-            <a:br>
-              <a:rPr lang="en-GB" sz="3600" kern="1400" dirty="0">
-                <a:solidFill>
-                  <a:srgbClr val="2A7B88"/>
-                </a:solidFill>
-                <a:latin typeface="Cambria" panose="02040503050406030204" pitchFamily="18" charset="0"/>
-                <a:ea typeface="Times New Roman" panose="02020603050405020304" pitchFamily="18" charset="0"/>
-                <a:cs typeface="Times New Roman" panose="02020603050405020304" pitchFamily="18" charset="0"/>
-              </a:rPr>
-            </a:br>
-            <a:r>
-              <a:rPr lang="en-GB" sz="2800" kern="1400" dirty="0">
-                <a:solidFill>
-                  <a:srgbClr val="2A7B88"/>
-                </a:solidFill>
-                <a:latin typeface="Cambria" panose="02040503050406030204" pitchFamily="18" charset="0"/>
-                <a:ea typeface="Times New Roman" panose="02020603050405020304" pitchFamily="18" charset="0"/>
-                <a:cs typeface="Times New Roman" panose="02020603050405020304" pitchFamily="18" charset="0"/>
-              </a:rPr>
-              <a:t>(rigorous method)</a:t>
-            </a:r>
+            <a:endParaRPr lang="en-GB" sz="2800" kern="1400" dirty="0">
+              <a:solidFill>
+                <a:srgbClr val="2A7B88"/>
+              </a:solidFill>
+              <a:latin typeface="Cambria" panose="02040503050406030204" pitchFamily="18" charset="0"/>
+              <a:ea typeface="Times New Roman" panose="02020603050405020304" pitchFamily="18" charset="0"/>
+              <a:cs typeface="Times New Roman" panose="02020603050405020304" pitchFamily="18" charset="0"/>
+            </a:endParaRPr>
           </a:p>
         </p:txBody>
       </p:sp>
@@ -13258,7 +12885,7 @@
                                           </p:stCondLst>
                                         </p:cTn>
                                         <p:tgtEl>
-                                          <p:spTgt spid="8"/>
+                                          <p:spTgt spid="15"/>
                                         </p:tgtEl>
                                         <p:attrNameLst>
                                           <p:attrName>style.visibility</p:attrName>
@@ -13272,94 +12899,6 @@
                                       <p:cBhvr>
                                         <p:cTn id="15" dur="500"/>
                                         <p:tgtEl>
-                                          <p:spTgt spid="8"/>
-                                        </p:tgtEl>
-                                      </p:cBhvr>
-                                    </p:animEffect>
-                                  </p:childTnLst>
-                                </p:cTn>
-                              </p:par>
-                              <p:par>
-                                <p:cTn id="16" presetID="10" presetClass="entr" presetSubtype="0" fill="hold" grpId="0" nodeType="withEffect">
-                                  <p:stCondLst>
-                                    <p:cond delay="0"/>
-                                  </p:stCondLst>
-                                  <p:childTnLst>
-                                    <p:set>
-                                      <p:cBhvr>
-                                        <p:cTn id="17" dur="1" fill="hold">
-                                          <p:stCondLst>
-                                            <p:cond delay="0"/>
-                                          </p:stCondLst>
-                                        </p:cTn>
-                                        <p:tgtEl>
-                                          <p:spTgt spid="9"/>
-                                        </p:tgtEl>
-                                        <p:attrNameLst>
-                                          <p:attrName>style.visibility</p:attrName>
-                                        </p:attrNameLst>
-                                      </p:cBhvr>
-                                      <p:to>
-                                        <p:strVal val="visible"/>
-                                      </p:to>
-                                    </p:set>
-                                    <p:animEffect transition="in" filter="fade">
-                                      <p:cBhvr>
-                                        <p:cTn id="18" dur="500"/>
-                                        <p:tgtEl>
-                                          <p:spTgt spid="9"/>
-                                        </p:tgtEl>
-                                      </p:cBhvr>
-                                    </p:animEffect>
-                                  </p:childTnLst>
-                                </p:cTn>
-                              </p:par>
-                            </p:childTnLst>
-                          </p:cTn>
-                        </p:par>
-                      </p:childTnLst>
-                    </p:cTn>
-                  </p:par>
-                  <p:par>
-                    <p:cTn id="19" fill="hold">
-                      <p:stCondLst>
-                        <p:cond delay="indefinite"/>
-                      </p:stCondLst>
-                      <p:childTnLst>
-                        <p:par>
-                          <p:cTn id="20" fill="hold">
-                            <p:stCondLst>
-                              <p:cond delay="0"/>
-                            </p:stCondLst>
-                            <p:childTnLst>
-                              <p:par>
-                                <p:cTn id="21" presetID="10" presetClass="entr" presetSubtype="0" fill="hold" grpId="0" nodeType="clickEffect">
-                                  <p:stCondLst>
-                                    <p:cond delay="0"/>
-                                  </p:stCondLst>
-                                  <p:childTnLst>
-                                    <p:set>
-                                      <p:cBhvr>
-                                        <p:cTn id="22" dur="1" fill="hold">
-                                          <p:stCondLst>
-                                            <p:cond delay="0"/>
-                                          </p:stCondLst>
-                                        </p:cTn>
-                                        <p:tgtEl>
-                                          <p:spTgt spid="15"/>
-                                        </p:tgtEl>
-                                        <p:attrNameLst>
-                                          <p:attrName>style.visibility</p:attrName>
-                                        </p:attrNameLst>
-                                      </p:cBhvr>
-                                      <p:to>
-                                        <p:strVal val="visible"/>
-                                      </p:to>
-                                    </p:set>
-                                    <p:animEffect transition="in" filter="fade">
-                                      <p:cBhvr>
-                                        <p:cTn id="23" dur="500"/>
-                                        <p:tgtEl>
                                           <p:spTgt spid="15"/>
                                         </p:tgtEl>
                                       </p:cBhvr>
@@ -13368,14 +12907,14 @@
                                 </p:cTn>
                               </p:par>
                               <p:par>
-                                <p:cTn id="24" presetID="10" presetClass="entr" presetSubtype="0" fill="hold" nodeType="withEffect">
+                                <p:cTn id="16" presetID="10" presetClass="entr" presetSubtype="0" fill="hold" nodeType="withEffect">
                                   <p:stCondLst>
                                     <p:cond delay="0"/>
                                   </p:stCondLst>
                                   <p:childTnLst>
                                     <p:set>
                                       <p:cBhvr>
-                                        <p:cTn id="25" dur="1" fill="hold">
+                                        <p:cTn id="17" dur="1" fill="hold">
                                           <p:stCondLst>
                                             <p:cond delay="0"/>
                                           </p:stCondLst>
@@ -13393,7 +12932,7 @@
                                     </p:set>
                                     <p:animEffect transition="in" filter="fade">
                                       <p:cBhvr>
-                                        <p:cTn id="26" dur="500"/>
+                                        <p:cTn id="18" dur="500"/>
                                         <p:tgtEl>
                                           <p:spTgt spid="14"/>
                                         </p:tgtEl>
@@ -13432,8 +12971,6 @@
     <p:bldLst>
       <p:bldP spid="6" grpId="0"/>
       <p:bldP spid="7" grpId="0"/>
-      <p:bldP spid="8" grpId="0"/>
-      <p:bldP spid="9" grpId="0"/>
       <p:bldP spid="15" grpId="0"/>
     </p:bldLst>
   </p:timing>

</xml_diff>